<commit_message>
created PDF also, changed "Theta" to greek letter
</commit_message>
<xml_diff>
--- a/slides/recurrences.pptx
+++ b/slides/recurrences.pptx
@@ -1030,7 +1030,7 @@
             <a:fld id="{7AA5AD8F-F3B0-42A1-BADE-3E121779D997}" type="datetime1">
               <a:rPr lang="en-US" smtClean="0"/>
               <a:pPr/>
-              <a:t>8/31/21</a:t>
+              <a:t>9/2/21</a:t>
             </a:fld>
             <a:endParaRPr lang="en-US"/>
           </a:p>
@@ -1390,7 +1390,7 @@
             <a:fld id="{70B371D5-F170-4574-829E-67713AA2AF8B}" type="datetime1">
               <a:rPr lang="en-US" smtClean="0"/>
               <a:pPr/>
-              <a:t>8/31/21</a:t>
+              <a:t>9/2/21</a:t>
             </a:fld>
             <a:endParaRPr lang="en-US"/>
           </a:p>
@@ -1566,7 +1566,7 @@
             <a:fld id="{41DEAF00-D1FE-4F71-8891-85EEE31B7478}" type="datetime1">
               <a:rPr lang="en-US" smtClean="0"/>
               <a:pPr/>
-              <a:t>8/31/21</a:t>
+              <a:t>9/2/21</a:t>
             </a:fld>
             <a:endParaRPr lang="en-US"/>
           </a:p>
@@ -1883,7 +1883,7 @@
             <a:fld id="{94B9C8BD-ED75-4439-AD6B-9DD62AAFC8D9}" type="datetime1">
               <a:rPr lang="en-US" smtClean="0"/>
               <a:pPr/>
-              <a:t>8/31/21</a:t>
+              <a:t>9/2/21</a:t>
             </a:fld>
             <a:endParaRPr lang="en-US"/>
           </a:p>
@@ -2169,7 +2169,7 @@
             <a:fld id="{ECD93607-5884-4A96-A08B-80229D166DF1}" type="datetime1">
               <a:rPr lang="en-US" smtClean="0"/>
               <a:pPr/>
-              <a:t>8/31/21</a:t>
+              <a:t>9/2/21</a:t>
             </a:fld>
             <a:endParaRPr lang="en-US"/>
           </a:p>
@@ -2390,7 +2390,7 @@
             <a:fld id="{6F102B80-C461-45FB-9371-DFC9B0CCC0E5}" type="datetime1">
               <a:rPr lang="en-US" smtClean="0"/>
               <a:pPr/>
-              <a:t>8/31/21</a:t>
+              <a:t>9/2/21</a:t>
             </a:fld>
             <a:endParaRPr lang="en-US"/>
           </a:p>
@@ -2743,7 +2743,7 @@
             <a:fld id="{EA9CD99D-5207-446B-9DC5-D0DDD2D44051}" type="datetime1">
               <a:rPr lang="en-US" smtClean="0"/>
               <a:pPr/>
-              <a:t>8/31/21</a:t>
+              <a:t>9/2/21</a:t>
             </a:fld>
             <a:endParaRPr lang="en-US"/>
           </a:p>
@@ -2976,7 +2976,7 @@
             <a:fld id="{72673F1E-8F53-44C8-9921-41D9D265AD14}" type="datetime1">
               <a:rPr lang="en-US" smtClean="0"/>
               <a:pPr/>
-              <a:t>8/31/21</a:t>
+              <a:t>9/2/21</a:t>
             </a:fld>
             <a:endParaRPr lang="en-US"/>
           </a:p>
@@ -3118,7 +3118,7 @@
             <a:fld id="{E298527C-C606-48C4-B4D5-2567D6898083}" type="datetime1">
               <a:rPr lang="en-US" smtClean="0"/>
               <a:pPr/>
-              <a:t>8/31/21</a:t>
+              <a:t>9/2/21</a:t>
             </a:fld>
             <a:endParaRPr lang="en-US"/>
           </a:p>
@@ -3396,7 +3396,7 @@
             <a:fld id="{1539330C-42EA-483B-AECF-1BED7029D168}" type="datetime1">
               <a:rPr lang="en-US" smtClean="0"/>
               <a:pPr/>
-              <a:t>8/31/21</a:t>
+              <a:t>9/2/21</a:t>
             </a:fld>
             <a:endParaRPr lang="en-US"/>
           </a:p>
@@ -3804,7 +3804,7 @@
             <a:fld id="{6164C552-CBA0-44FF-B21C-CCB2A0CE4F32}" type="datetime1">
               <a:rPr lang="en-US" smtClean="0"/>
               <a:pPr/>
-              <a:t>8/31/21</a:t>
+              <a:t>9/2/21</a:t>
             </a:fld>
             <a:endParaRPr lang="en-US"/>
           </a:p>
@@ -4143,7 +4143,7 @@
             <a:fld id="{616F3C91-9847-4E06-A788-F916DE9E864B}" type="datetime1">
               <a:rPr lang="en-US" smtClean="0"/>
               <a:pPr/>
-              <a:t>8/31/21</a:t>
+              <a:t>9/2/21</a:t>
             </a:fld>
             <a:endParaRPr lang="en-US"/>
           </a:p>
@@ -4856,8 +4856,17 @@
               <a:t> &lt;= 4*n = </a:t>
             </a:r>
             <a:r>
+              <a:rPr lang="en-US" altLang="en-US" b="1" dirty="0">
+                <a:latin typeface="Calibri" panose="020F0502020204030204" pitchFamily="34" charset="0"/>
+                <a:ea typeface="ＭＳ Ｐゴシック" panose="020B0600070205080204" pitchFamily="34" charset="-128"/>
+                <a:cs typeface="Calibri" panose="020F0502020204030204" pitchFamily="34" charset="0"/>
+                <a:sym typeface="Symbol" pitchFamily="2" charset="2"/>
+              </a:rPr>
+              <a:t></a:t>
+            </a:r>
+            <a:r>
               <a:rPr lang="en-US" b="1" dirty="0"/>
-              <a:t>Theta(n)</a:t>
+              <a:t>(n)</a:t>
             </a:r>
           </a:p>
         </p:txBody>
@@ -5010,7 +5019,20 @@
             </a:r>
             <a:r>
               <a:rPr lang="en-US" dirty="0"/>
-              <a:t> + Theta(n)</a:t>
+              <a:t> + </a:t>
+            </a:r>
+            <a:r>
+              <a:rPr lang="en-US" altLang="en-US" dirty="0">
+                <a:latin typeface="Calibri" panose="020F0502020204030204" pitchFamily="34" charset="0"/>
+                <a:ea typeface="ＭＳ Ｐゴシック" panose="020B0600070205080204" pitchFamily="34" charset="-128"/>
+                <a:cs typeface="Calibri" panose="020F0502020204030204" pitchFamily="34" charset="0"/>
+                <a:sym typeface="Symbol" pitchFamily="2" charset="2"/>
+              </a:rPr>
+              <a:t></a:t>
+            </a:r>
+            <a:r>
+              <a:rPr lang="en-US" dirty="0"/>
+              <a:t>(n)</a:t>
             </a:r>
           </a:p>
           <a:p>
@@ -5024,7 +5046,20 @@
             </a:r>
             <a:r>
               <a:rPr lang="en-US" dirty="0"/>
-              <a:t> + Theta(n)      //log rules</a:t>
+              <a:t> + </a:t>
+            </a:r>
+            <a:r>
+              <a:rPr lang="en-US" altLang="en-US" dirty="0">
+                <a:latin typeface="Calibri" panose="020F0502020204030204" pitchFamily="34" charset="0"/>
+                <a:ea typeface="ＭＳ Ｐゴシック" panose="020B0600070205080204" pitchFamily="34" charset="-128"/>
+                <a:cs typeface="Calibri" panose="020F0502020204030204" pitchFamily="34" charset="0"/>
+                <a:sym typeface="Symbol" pitchFamily="2" charset="2"/>
+              </a:rPr>
+              <a:t></a:t>
+            </a:r>
+            <a:r>
+              <a:rPr lang="en-US" dirty="0"/>
+              <a:t>(n)      //log rules</a:t>
             </a:r>
           </a:p>
           <a:p>
@@ -5033,7 +5068,20 @@
           <a:p>
             <a:r>
               <a:rPr lang="en-US" dirty="0"/>
-              <a:t>T(n) = o(n) + Theta(n)</a:t>
+              <a:t>T(n) = o(n) + </a:t>
+            </a:r>
+            <a:r>
+              <a:rPr lang="en-US" altLang="en-US" dirty="0">
+                <a:latin typeface="Calibri" panose="020F0502020204030204" pitchFamily="34" charset="0"/>
+                <a:ea typeface="ＭＳ Ｐゴシック" panose="020B0600070205080204" pitchFamily="34" charset="-128"/>
+                <a:cs typeface="Calibri" panose="020F0502020204030204" pitchFamily="34" charset="0"/>
+                <a:sym typeface="Symbol" pitchFamily="2" charset="2"/>
+              </a:rPr>
+              <a:t></a:t>
+            </a:r>
+            <a:r>
+              <a:rPr lang="en-US" dirty="0"/>
+              <a:t>(n)</a:t>
             </a:r>
           </a:p>
           <a:p>
@@ -5042,7 +5090,20 @@
           <a:p>
             <a:r>
               <a:rPr lang="en-US" b="1" i="1" u="sng" dirty="0"/>
-              <a:t>T(n) = Theta(n)</a:t>
+              <a:t>T(n) = </a:t>
+            </a:r>
+            <a:r>
+              <a:rPr lang="en-US" altLang="en-US" b="1" u="sng" dirty="0">
+                <a:latin typeface="Calibri" panose="020F0502020204030204" pitchFamily="34" charset="0"/>
+                <a:ea typeface="ＭＳ Ｐゴシック" panose="020B0600070205080204" pitchFamily="34" charset="-128"/>
+                <a:cs typeface="Calibri" panose="020F0502020204030204" pitchFamily="34" charset="0"/>
+                <a:sym typeface="Symbol" pitchFamily="2" charset="2"/>
+              </a:rPr>
+              <a:t></a:t>
+            </a:r>
+            <a:r>
+              <a:rPr lang="en-US" b="1" i="1" u="sng" dirty="0"/>
+              <a:t>(n)</a:t>
             </a:r>
           </a:p>
           <a:p>
@@ -6609,7 +6670,7 @@
           <a:graphicData uri="http://schemas.openxmlformats.org/presentationml/2006/ole">
             <mc:AlternateContent xmlns:mc="http://schemas.openxmlformats.org/markup-compatibility/2006">
               <mc:Choice xmlns:v="urn:schemas-microsoft-com:vml" Requires="v">
-                <p:oleObj spid="_x0000_s39009" name="Photo Editor Photo" r:id="rId6" imgW="7658764" imgH="4031329" progId="">
+                <p:oleObj spid="_x0000_s39010" name="Photo Editor Photo" r:id="rId6" imgW="7658764" imgH="4031329" progId="">
                   <p:embed/>
                 </p:oleObj>
               </mc:Choice>
@@ -6651,14 +6712,14 @@
                       </a:ln>
                       <a:extLst>
                         <a:ext uri="{909E8E84-426E-40dd-AFC4-6F175D3DCCD1}">
-                          <a14:hiddenFill xmlns="" xmlns:a14="http://schemas.microsoft.com/office/drawing/2010/main">
+                          <a14:hiddenFill xmlns:a14="http://schemas.microsoft.com/office/drawing/2010/main" xmlns="">
                             <a:solidFill>
                               <a:schemeClr val="tx1"/>
                             </a:solidFill>
                           </a14:hiddenFill>
                         </a:ext>
                         <a:ext uri="{91240B29-F687-4f45-9708-019B960494DF}">
-                          <a14:hiddenLine xmlns="" xmlns:a14="http://schemas.microsoft.com/office/drawing/2010/main" w="9525">
+                          <a14:hiddenLine xmlns:a14="http://schemas.microsoft.com/office/drawing/2010/main" xmlns="" w="9525">
                             <a:solidFill>
                               <a:schemeClr val="tx1"/>
                             </a:solidFill>

</xml_diff>

<commit_message>
fix on side 17
</commit_message>
<xml_diff>
--- a/slides/recurrences.pptx
+++ b/slides/recurrences.pptx
@@ -6299,8 +6299,13 @@
             <a:pPr lvl="1"/>
             <a:r>
               <a:rPr lang="en-US" dirty="0"/>
-              <a:t>T(n) &lt;= c*n -2d + 1 &lt;= c*n		//as long as d &gt;= 1/2</a:t>
-            </a:r>
+              <a:t>T(n) &lt;= c*n -2d + 1 &lt;= c*n - d		//as long as </a:t>
+            </a:r>
+            <a:r>
+              <a:rPr lang="en-US"/>
+              <a:t>d &gt;= 1</a:t>
+            </a:r>
+            <a:endParaRPr lang="en-US" dirty="0"/>
           </a:p>
           <a:p>
             <a:pPr lvl="1"/>
@@ -7683,7 +7688,7 @@
           <a:graphicData uri="http://schemas.openxmlformats.org/presentationml/2006/ole">
             <mc:AlternateContent xmlns:mc="http://schemas.openxmlformats.org/markup-compatibility/2006">
               <mc:Choice xmlns:v="urn:schemas-microsoft-com:vml" Requires="v">
-                <p:oleObj spid="_x0000_s39024" name="Photo Editor Photo" r:id="rId6" imgW="7658764" imgH="4031329" progId="">
+                <p:oleObj spid="_x0000_s39025" name="Photo Editor Photo" r:id="rId6" imgW="7658764" imgH="4031329" progId="">
                   <p:embed/>
                 </p:oleObj>
               </mc:Choice>

</xml_diff>